<commit_message>
updated poster and images for poster
</commit_message>
<xml_diff>
--- a/QA_Presentation/poster.pptx
+++ b/QA_Presentation/poster.pptx
@@ -4372,10 +4372,10 @@
       </p:sp>
       <p:pic>
         <p:nvPicPr>
-          <p:cNvPr id="5" name="Picture 4">
+          <p:cNvPr id="6" name="Picture 5">
             <a:extLst>
               <a:ext uri="{FF2B5EF4-FFF2-40B4-BE49-F238E27FC236}">
-                <a16:creationId xmlns:a16="http://schemas.microsoft.com/office/drawing/2014/main" id="{A1BED072-7A16-4DC1-B1CE-9C431C67E6CC}"/>
+                <a16:creationId xmlns:a16="http://schemas.microsoft.com/office/drawing/2014/main" id="{58A69DF8-2053-45E8-970D-638ADF26AF02}"/>
               </a:ext>
             </a:extLst>
           </p:cNvPr>
@@ -4398,8 +4398,425 @@
         </p:blipFill>
         <p:spPr>
           <a:xfrm>
-            <a:off x="8534401" y="7644689"/>
-            <a:ext cx="13395960" cy="25273712"/>
+            <a:off x="10668000" y="3231244"/>
+            <a:ext cx="11537156" cy="14251781"/>
+          </a:xfrm>
+          <a:prstGeom prst="rect">
+            <a:avLst/>
+          </a:prstGeom>
+        </p:spPr>
+      </p:pic>
+      <p:pic>
+        <p:nvPicPr>
+          <p:cNvPr id="8" name="Picture 7">
+            <a:extLst>
+              <a:ext uri="{FF2B5EF4-FFF2-40B4-BE49-F238E27FC236}">
+                <a16:creationId xmlns:a16="http://schemas.microsoft.com/office/drawing/2014/main" id="{4FEFB327-CBBE-44F0-BF1D-47259D628F85}"/>
+              </a:ext>
+            </a:extLst>
+          </p:cNvPr>
+          <p:cNvPicPr>
+            <a:picLocks noChangeAspect="1"/>
+          </p:cNvPicPr>
+          <p:nvPr/>
+        </p:nvPicPr>
+        <p:blipFill>
+          <a:blip r:embed="rId6">
+            <a:extLst>
+              <a:ext uri="{28A0092B-C50C-407E-A947-70E740481C1C}">
+                <a14:useLocalDpi xmlns:a14="http://schemas.microsoft.com/office/drawing/2010/main" val="0"/>
+              </a:ext>
+            </a:extLst>
+          </a:blip>
+          <a:stretch>
+            <a:fillRect/>
+          </a:stretch>
+        </p:blipFill>
+        <p:spPr>
+          <a:xfrm>
+            <a:off x="-279883" y="18277758"/>
+            <a:ext cx="14251781" cy="14912340"/>
+          </a:xfrm>
+          <a:prstGeom prst="rect">
+            <a:avLst/>
+          </a:prstGeom>
+        </p:spPr>
+      </p:pic>
+      <p:sp>
+        <p:nvSpPr>
+          <p:cNvPr id="9" name="Rectangle 8">
+            <a:extLst>
+              <a:ext uri="{FF2B5EF4-FFF2-40B4-BE49-F238E27FC236}">
+                <a16:creationId xmlns:a16="http://schemas.microsoft.com/office/drawing/2014/main" id="{64B5003B-4ADD-4F2B-97EB-6C0EC77D4CEC}"/>
+              </a:ext>
+            </a:extLst>
+          </p:cNvPr>
+          <p:cNvSpPr/>
+          <p:nvPr/>
+        </p:nvSpPr>
+        <p:spPr>
+          <a:xfrm>
+            <a:off x="5006" y="3447563"/>
+            <a:ext cx="10972800" cy="14144321"/>
+          </a:xfrm>
+          <a:prstGeom prst="rect">
+            <a:avLst/>
+          </a:prstGeom>
+        </p:spPr>
+        <p:txBody>
+          <a:bodyPr>
+            <a:spAutoFit/>
+          </a:bodyPr>
+          <a:lstStyle/>
+          <a:p>
+            <a:pPr>
+              <a:lnSpc>
+                <a:spcPts val="5500"/>
+              </a:lnSpc>
+            </a:pPr>
+            <a:r>
+              <a:rPr lang="en-US" sz="3600" b="1" dirty="0"/>
+              <a:t>Algorithms:</a:t>
+            </a:r>
+            <a:r>
+              <a:rPr lang="en-US" sz="3600" dirty="0"/>
+              <a:t> POS tagging, NER, word stemming, word overlap, Cosine Similarity</a:t>
+            </a:r>
+          </a:p>
+          <a:p>
+            <a:pPr>
+              <a:lnSpc>
+                <a:spcPts val="5500"/>
+              </a:lnSpc>
+            </a:pPr>
+            <a:endParaRPr lang="en-US" sz="3600" dirty="0"/>
+          </a:p>
+          <a:p>
+            <a:pPr>
+              <a:lnSpc>
+                <a:spcPts val="5500"/>
+              </a:lnSpc>
+            </a:pPr>
+            <a:r>
+              <a:rPr lang="en-US" sz="3600" b="1" dirty="0"/>
+              <a:t>Contributions: </a:t>
+            </a:r>
+            <a:r>
+              <a:rPr lang="en-US" sz="3600" dirty="0"/>
+              <a:t>Spacy – Eric</a:t>
+            </a:r>
+          </a:p>
+          <a:p>
+            <a:pPr>
+              <a:lnSpc>
+                <a:spcPts val="5500"/>
+              </a:lnSpc>
+            </a:pPr>
+            <a:r>
+              <a:rPr lang="en-US" sz="3600" dirty="0"/>
+              <a:t>Question typing – Eric, Jonathan</a:t>
+            </a:r>
+          </a:p>
+          <a:p>
+            <a:pPr>
+              <a:lnSpc>
+                <a:spcPts val="5500"/>
+              </a:lnSpc>
+            </a:pPr>
+            <a:r>
+              <a:rPr lang="en-US" sz="3600" dirty="0"/>
+              <a:t>Verb typing – Jonathan, Eric</a:t>
+            </a:r>
+          </a:p>
+          <a:p>
+            <a:pPr>
+              <a:lnSpc>
+                <a:spcPts val="5500"/>
+              </a:lnSpc>
+            </a:pPr>
+            <a:r>
+              <a:rPr lang="en-US" sz="3600" dirty="0"/>
+              <a:t>Cosine Similarity – Jonathan</a:t>
+            </a:r>
+          </a:p>
+          <a:p>
+            <a:pPr>
+              <a:lnSpc>
+                <a:spcPts val="5500"/>
+              </a:lnSpc>
+            </a:pPr>
+            <a:endParaRPr lang="en-US" sz="3600" dirty="0"/>
+          </a:p>
+          <a:p>
+            <a:pPr>
+              <a:lnSpc>
+                <a:spcPts val="5500"/>
+              </a:lnSpc>
+            </a:pPr>
+            <a:r>
+              <a:rPr lang="en-US" sz="3600" b="1" dirty="0"/>
+              <a:t>External Resources:</a:t>
+            </a:r>
+            <a:r>
+              <a:rPr lang="en-US" sz="3600" dirty="0"/>
+              <a:t> Spacy library – https://spacy.io</a:t>
+            </a:r>
+          </a:p>
+          <a:p>
+            <a:pPr>
+              <a:lnSpc>
+                <a:spcPts val="5500"/>
+              </a:lnSpc>
+            </a:pPr>
+            <a:endParaRPr lang="en-US" sz="3600" b="1" dirty="0"/>
+          </a:p>
+          <a:p>
+            <a:pPr>
+              <a:lnSpc>
+                <a:spcPts val="5500"/>
+              </a:lnSpc>
+            </a:pPr>
+            <a:r>
+              <a:rPr lang="en-US" sz="3600" b="1" dirty="0"/>
+              <a:t>Emphasis:</a:t>
+            </a:r>
+            <a:r>
+              <a:rPr lang="en-US" sz="3600" dirty="0"/>
+              <a:t> the cornerstone of our system was originally question typing; we later added cosine similarity and what we call ‘verb typing’.  </a:t>
+            </a:r>
+          </a:p>
+          <a:p>
+            <a:pPr>
+              <a:lnSpc>
+                <a:spcPts val="5500"/>
+              </a:lnSpc>
+            </a:pPr>
+            <a:r>
+              <a:rPr lang="en-US" sz="3600" b="1" dirty="0"/>
+              <a:t>   </a:t>
+            </a:r>
+            <a:r>
+              <a:rPr lang="en-US" sz="3600" dirty="0"/>
+              <a:t>To handle “what” questions, our system looks in the question for a verb and searches for sentences containing the rooted verb.</a:t>
+            </a:r>
+          </a:p>
+          <a:p>
+            <a:pPr>
+              <a:lnSpc>
+                <a:spcPts val="5500"/>
+              </a:lnSpc>
+            </a:pPr>
+            <a:endParaRPr lang="en-US" sz="3600" b="1" dirty="0"/>
+          </a:p>
+          <a:p>
+            <a:pPr>
+              <a:lnSpc>
+                <a:spcPts val="5500"/>
+              </a:lnSpc>
+            </a:pPr>
+            <a:r>
+              <a:rPr lang="en-US" sz="3600" b="1" dirty="0"/>
+              <a:t>Performance:</a:t>
+            </a:r>
+            <a:r>
+              <a:rPr lang="en-US" sz="3600" dirty="0"/>
+              <a:t> We had an F-score of 0.32, with a recall of .38 and precision .28.  Our system did well with ‘who’ questions and questions asking for numbers.  </a:t>
+            </a:r>
+          </a:p>
+        </p:txBody>
+      </p:sp>
+      <p:pic>
+        <p:nvPicPr>
+          <p:cNvPr id="14" name="Picture 13">
+            <a:extLst>
+              <a:ext uri="{FF2B5EF4-FFF2-40B4-BE49-F238E27FC236}">
+                <a16:creationId xmlns:a16="http://schemas.microsoft.com/office/drawing/2014/main" id="{75075A80-D8F1-4658-8FA1-E6D8A7971B53}"/>
+              </a:ext>
+            </a:extLst>
+          </p:cNvPr>
+          <p:cNvPicPr>
+            <a:picLocks noChangeAspect="1"/>
+          </p:cNvPicPr>
+          <p:nvPr/>
+        </p:nvPicPr>
+        <p:blipFill>
+          <a:blip r:embed="rId7">
+            <a:extLst>
+              <a:ext uri="{28A0092B-C50C-407E-A947-70E740481C1C}">
+                <a14:useLocalDpi xmlns:a14="http://schemas.microsoft.com/office/drawing/2010/main" val="0"/>
+              </a:ext>
+            </a:extLst>
+          </a:blip>
+          <a:stretch>
+            <a:fillRect/>
+          </a:stretch>
+        </p:blipFill>
+        <p:spPr>
+          <a:xfrm>
+            <a:off x="6920763" y="4951900"/>
+            <a:ext cx="6795496" cy="2428859"/>
+          </a:xfrm>
+          <a:prstGeom prst="rect">
+            <a:avLst/>
+          </a:prstGeom>
+        </p:spPr>
+      </p:pic>
+      <p:sp>
+        <p:nvSpPr>
+          <p:cNvPr id="16" name="Rectangle 15">
+            <a:extLst>
+              <a:ext uri="{FF2B5EF4-FFF2-40B4-BE49-F238E27FC236}">
+                <a16:creationId xmlns:a16="http://schemas.microsoft.com/office/drawing/2014/main" id="{72802A9B-FFBD-4D43-BC8F-D7D39FDFC1D8}"/>
+              </a:ext>
+            </a:extLst>
+          </p:cNvPr>
+          <p:cNvSpPr/>
+          <p:nvPr/>
+        </p:nvSpPr>
+        <p:spPr>
+          <a:xfrm>
+            <a:off x="13601046" y="20897311"/>
+            <a:ext cx="8256308" cy="10617715"/>
+          </a:xfrm>
+          <a:prstGeom prst="rect">
+            <a:avLst/>
+          </a:prstGeom>
+        </p:spPr>
+        <p:txBody>
+          <a:bodyPr wrap="square">
+            <a:spAutoFit/>
+          </a:bodyPr>
+          <a:lstStyle/>
+          <a:p>
+            <a:pPr lvl="0">
+              <a:lnSpc>
+                <a:spcPts val="5500"/>
+              </a:lnSpc>
+            </a:pPr>
+            <a:r>
+              <a:rPr lang="en-US" sz="3600" b="1" dirty="0">
+                <a:solidFill>
+                  <a:prstClr val="black"/>
+                </a:solidFill>
+              </a:rPr>
+              <a:t>Regrets:</a:t>
+            </a:r>
+            <a:r>
+              <a:rPr lang="en-US" sz="3600" dirty="0">
+                <a:solidFill>
+                  <a:prstClr val="black"/>
+                </a:solidFill>
+              </a:rPr>
+              <a:t> limiting the response to 7 words before and after a verb didn’t work well.  It returned the correct answer in some cases, but hurt recall more than it helped precision.  </a:t>
+            </a:r>
+          </a:p>
+          <a:p>
+            <a:pPr lvl="0">
+              <a:lnSpc>
+                <a:spcPts val="5500"/>
+              </a:lnSpc>
+            </a:pPr>
+            <a:endParaRPr lang="en-US" sz="3600" dirty="0">
+              <a:solidFill>
+                <a:prstClr val="black"/>
+              </a:solidFill>
+            </a:endParaRPr>
+          </a:p>
+          <a:p>
+            <a:pPr lvl="0">
+              <a:lnSpc>
+                <a:spcPts val="5500"/>
+              </a:lnSpc>
+            </a:pPr>
+            <a:r>
+              <a:rPr lang="en-US" sz="3600" b="1" dirty="0">
+                <a:solidFill>
+                  <a:prstClr val="black"/>
+                </a:solidFill>
+              </a:rPr>
+              <a:t>Successes:</a:t>
+            </a:r>
+            <a:r>
+              <a:rPr lang="en-US" sz="3600" dirty="0">
+                <a:solidFill>
+                  <a:prstClr val="black"/>
+                </a:solidFill>
+              </a:rPr>
+              <a:t> using question typing and NER in combination with cosine similarity was very successful, helping the system find likely answers depending on the question text.  </a:t>
+            </a:r>
+          </a:p>
+          <a:p>
+            <a:pPr lvl="0">
+              <a:lnSpc>
+                <a:spcPts val="5500"/>
+              </a:lnSpc>
+            </a:pPr>
+            <a:endParaRPr lang="en-US" sz="3600" b="1" dirty="0">
+              <a:solidFill>
+                <a:prstClr val="black"/>
+              </a:solidFill>
+            </a:endParaRPr>
+          </a:p>
+          <a:p>
+            <a:pPr lvl="0">
+              <a:lnSpc>
+                <a:spcPts val="5500"/>
+              </a:lnSpc>
+            </a:pPr>
+            <a:r>
+              <a:rPr lang="en-US" sz="3600" b="1" dirty="0">
+                <a:solidFill>
+                  <a:prstClr val="black"/>
+                </a:solidFill>
+              </a:rPr>
+              <a:t>Lessons Learned:</a:t>
+            </a:r>
+            <a:r>
+              <a:rPr lang="en-US" sz="3600" dirty="0">
+                <a:solidFill>
+                  <a:prstClr val="black"/>
+                </a:solidFill>
+              </a:rPr>
+              <a:t> it’s hard to build a system that can understand language and answer even the simplest of questions.  </a:t>
+            </a:r>
+            <a:endParaRPr lang="en-US" sz="3600" b="1" dirty="0">
+              <a:solidFill>
+                <a:prstClr val="black"/>
+              </a:solidFill>
+            </a:endParaRPr>
+          </a:p>
+        </p:txBody>
+      </p:sp>
+      <p:pic>
+        <p:nvPicPr>
+          <p:cNvPr id="18" name="Picture 17">
+            <a:extLst>
+              <a:ext uri="{FF2B5EF4-FFF2-40B4-BE49-F238E27FC236}">
+                <a16:creationId xmlns:a16="http://schemas.microsoft.com/office/drawing/2014/main" id="{5CD337CC-B58F-45C8-A108-01B0249F8B09}"/>
+              </a:ext>
+            </a:extLst>
+          </p:cNvPr>
+          <p:cNvPicPr>
+            <a:picLocks noChangeAspect="1"/>
+          </p:cNvPicPr>
+          <p:nvPr/>
+        </p:nvPicPr>
+        <p:blipFill>
+          <a:blip r:embed="rId8">
+            <a:extLst>
+              <a:ext uri="{28A0092B-C50C-407E-A947-70E740481C1C}">
+                <a14:useLocalDpi xmlns:a14="http://schemas.microsoft.com/office/drawing/2010/main" val="0"/>
+              </a:ext>
+            </a:extLst>
+          </a:blip>
+          <a:stretch>
+            <a:fillRect/>
+          </a:stretch>
+        </p:blipFill>
+        <p:spPr>
+          <a:xfrm>
+            <a:off x="9296401" y="15933468"/>
+            <a:ext cx="6374332" cy="6374332"/>
           </a:xfrm>
           <a:prstGeom prst="rect">
             <a:avLst/>
@@ -5345,73 +5762,6 @@
 </file>
 
 <file path=customXml/item1.xml><?xml version="1.0" encoding="utf-8"?>
-<p:properties xmlns:p="http://schemas.microsoft.com/office/2006/metadata/properties" xmlns:xsi="http://www.w3.org/2001/XMLSchema-instance" xmlns:pc="http://schemas.microsoft.com/office/infopath/2007/PartnerControls">
-  <documentManagement>
-    <_dlc_DocId xmlns="db534a5e-1222-4db9-a6da-47c142019016">RUP43XDAYXKA-2-4395</_dlc_DocId>
-    <_dlc_DocIdUrl xmlns="db534a5e-1222-4db9-a6da-47c142019016">
-      <Url>https://staffnet.library.utah.edu/personal/u0031319/_layouts/DocIdRedir.aspx?ID=RUP43XDAYXKA-2-4395</Url>
-      <Description>RUP43XDAYXKA-2-4395</Description>
-    </_dlc_DocIdUrl>
-  </documentManagement>
-</p:properties>
-</file>
-
-<file path=customXml/item2.xml><?xml version="1.0" encoding="utf-8"?>
-<?mso-contentType ?>
-<FormTemplates xmlns="http://schemas.microsoft.com/sharepoint/v3/contenttype/forms">
-  <Display>DocumentLibraryForm</Display>
-  <Edit>DocumentLibraryForm</Edit>
-  <New>DocumentLibraryForm</New>
-</FormTemplates>
-</file>
-
-<file path=customXml/item3.xml><?xml version="1.0" encoding="utf-8"?>
-<?mso-contentType ?>
-<spe:Receivers xmlns:spe="http://schemas.microsoft.com/sharepoint/events">
-  <Receiver>
-    <Name>Document ID Generator</Name>
-    <Synchronization>Synchronous</Synchronization>
-    <Type>10001</Type>
-    <SequenceNumber>1000</SequenceNumber>
-    <Assembly>Microsoft.Office.DocumentManagement, Version=14.0.0.0, Culture=neutral, PublicKeyToken=71e9bce111e9429c</Assembly>
-    <Class>Microsoft.Office.DocumentManagement.Internal.DocIdHandler</Class>
-    <Data/>
-    <Filter/>
-  </Receiver>
-  <Receiver>
-    <Name>Document ID Generator</Name>
-    <Synchronization>Synchronous</Synchronization>
-    <Type>10002</Type>
-    <SequenceNumber>1001</SequenceNumber>
-    <Assembly>Microsoft.Office.DocumentManagement, Version=14.0.0.0, Culture=neutral, PublicKeyToken=71e9bce111e9429c</Assembly>
-    <Class>Microsoft.Office.DocumentManagement.Internal.DocIdHandler</Class>
-    <Data/>
-    <Filter/>
-  </Receiver>
-  <Receiver>
-    <Name>Document ID Generator</Name>
-    <Synchronization>Synchronous</Synchronization>
-    <Type>10004</Type>
-    <SequenceNumber>1002</SequenceNumber>
-    <Assembly>Microsoft.Office.DocumentManagement, Version=14.0.0.0, Culture=neutral, PublicKeyToken=71e9bce111e9429c</Assembly>
-    <Class>Microsoft.Office.DocumentManagement.Internal.DocIdHandler</Class>
-    <Data/>
-    <Filter/>
-  </Receiver>
-  <Receiver>
-    <Name>Document ID Generator</Name>
-    <Synchronization>Synchronous</Synchronization>
-    <Type>10006</Type>
-    <SequenceNumber>1003</SequenceNumber>
-    <Assembly>Microsoft.Office.DocumentManagement, Version=14.0.0.0, Culture=neutral, PublicKeyToken=71e9bce111e9429c</Assembly>
-    <Class>Microsoft.Office.DocumentManagement.Internal.DocIdHandler</Class>
-    <Data/>
-    <Filter/>
-  </Receiver>
-</spe:Receivers>
-</file>
-
-<file path=customXml/item4.xml><?xml version="1.0" encoding="utf-8"?>
 <ct:contentTypeSchema xmlns:ct="http://schemas.microsoft.com/office/2006/metadata/contentType" xmlns:ma="http://schemas.microsoft.com/office/2006/metadata/properties/metaAttributes" ct:_="" ma:_="" ma:contentTypeName="Document" ma:contentTypeID="0x010100198492E96F6ACC44BBBEB5EFA434EED1" ma:contentTypeVersion="1" ma:contentTypeDescription="Create a new document." ma:contentTypeScope="" ma:versionID="cf296b60bf990032323d1c6d41ae543b">
   <xsd:schema xmlns:xsd="http://www.w3.org/2001/XMLSchema" xmlns:xs="http://www.w3.org/2001/XMLSchema" xmlns:p="http://schemas.microsoft.com/office/2006/metadata/properties" xmlns:ns2="db534a5e-1222-4db9-a6da-47c142019016" targetNamespace="http://schemas.microsoft.com/office/2006/metadata/properties" ma:root="true" ma:fieldsID="491b76b6be48514c30ba3200299e7b7f" ns2:_="">
     <xsd:import namespace="db534a5e-1222-4db9-a6da-47c142019016"/>
@@ -5556,33 +5906,74 @@
 </ct:contentTypeSchema>
 </file>
 
-<file path=customXml/itemProps1.xml><?xml version="1.0" encoding="utf-8"?>
-<ds:datastoreItem xmlns:ds="http://schemas.openxmlformats.org/officeDocument/2006/customXml" ds:itemID="{188DB492-5879-4998-90FC-E865BEF428C1}">
-  <ds:schemaRefs>
-    <ds:schemaRef ds:uri="http://schemas.microsoft.com/office/2006/metadata/properties"/>
-    <ds:schemaRef ds:uri="http://schemas.microsoft.com/office/infopath/2007/PartnerControls"/>
-    <ds:schemaRef ds:uri="db534a5e-1222-4db9-a6da-47c142019016"/>
-  </ds:schemaRefs>
-</ds:datastoreItem>
+<file path=customXml/item2.xml><?xml version="1.0" encoding="utf-8"?>
+<?mso-contentType ?>
+<spe:Receivers xmlns:spe="http://schemas.microsoft.com/sharepoint/events">
+  <Receiver>
+    <Name>Document ID Generator</Name>
+    <Synchronization>Synchronous</Synchronization>
+    <Type>10001</Type>
+    <SequenceNumber>1000</SequenceNumber>
+    <Assembly>Microsoft.Office.DocumentManagement, Version=14.0.0.0, Culture=neutral, PublicKeyToken=71e9bce111e9429c</Assembly>
+    <Class>Microsoft.Office.DocumentManagement.Internal.DocIdHandler</Class>
+    <Data/>
+    <Filter/>
+  </Receiver>
+  <Receiver>
+    <Name>Document ID Generator</Name>
+    <Synchronization>Synchronous</Synchronization>
+    <Type>10002</Type>
+    <SequenceNumber>1001</SequenceNumber>
+    <Assembly>Microsoft.Office.DocumentManagement, Version=14.0.0.0, Culture=neutral, PublicKeyToken=71e9bce111e9429c</Assembly>
+    <Class>Microsoft.Office.DocumentManagement.Internal.DocIdHandler</Class>
+    <Data/>
+    <Filter/>
+  </Receiver>
+  <Receiver>
+    <Name>Document ID Generator</Name>
+    <Synchronization>Synchronous</Synchronization>
+    <Type>10004</Type>
+    <SequenceNumber>1002</SequenceNumber>
+    <Assembly>Microsoft.Office.DocumentManagement, Version=14.0.0.0, Culture=neutral, PublicKeyToken=71e9bce111e9429c</Assembly>
+    <Class>Microsoft.Office.DocumentManagement.Internal.DocIdHandler</Class>
+    <Data/>
+    <Filter/>
+  </Receiver>
+  <Receiver>
+    <Name>Document ID Generator</Name>
+    <Synchronization>Synchronous</Synchronization>
+    <Type>10006</Type>
+    <SequenceNumber>1003</SequenceNumber>
+    <Assembly>Microsoft.Office.DocumentManagement, Version=14.0.0.0, Culture=neutral, PublicKeyToken=71e9bce111e9429c</Assembly>
+    <Class>Microsoft.Office.DocumentManagement.Internal.DocIdHandler</Class>
+    <Data/>
+    <Filter/>
+  </Receiver>
+</spe:Receivers>
 </file>
 
-<file path=customXml/itemProps2.xml><?xml version="1.0" encoding="utf-8"?>
-<ds:datastoreItem xmlns:ds="http://schemas.openxmlformats.org/officeDocument/2006/customXml" ds:itemID="{507C3C16-BC59-4883-ABE4-0911E3FE1B90}">
-  <ds:schemaRefs>
-    <ds:schemaRef ds:uri="http://schemas.microsoft.com/sharepoint/v3/contenttype/forms"/>
-  </ds:schemaRefs>
-</ds:datastoreItem>
+<file path=customXml/item3.xml><?xml version="1.0" encoding="utf-8"?>
+<?mso-contentType ?>
+<FormTemplates xmlns="http://schemas.microsoft.com/sharepoint/v3/contenttype/forms">
+  <Display>DocumentLibraryForm</Display>
+  <Edit>DocumentLibraryForm</Edit>
+  <New>DocumentLibraryForm</New>
+</FormTemplates>
 </file>
 
-<file path=customXml/itemProps3.xml><?xml version="1.0" encoding="utf-8"?>
-<ds:datastoreItem xmlns:ds="http://schemas.openxmlformats.org/officeDocument/2006/customXml" ds:itemID="{CA62BF48-A576-4D85-A587-1744F931CE21}">
-  <ds:schemaRefs>
-    <ds:schemaRef ds:uri="http://schemas.microsoft.com/sharepoint/events"/>
-  </ds:schemaRefs>
-</ds:datastoreItem>
+<file path=customXml/item4.xml><?xml version="1.0" encoding="utf-8"?>
+<p:properties xmlns:p="http://schemas.microsoft.com/office/2006/metadata/properties" xmlns:xsi="http://www.w3.org/2001/XMLSchema-instance" xmlns:pc="http://schemas.microsoft.com/office/infopath/2007/PartnerControls">
+  <documentManagement>
+    <_dlc_DocId xmlns="db534a5e-1222-4db9-a6da-47c142019016">RUP43XDAYXKA-2-4395</_dlc_DocId>
+    <_dlc_DocIdUrl xmlns="db534a5e-1222-4db9-a6da-47c142019016">
+      <Url>https://staffnet.library.utah.edu/personal/u0031319/_layouts/DocIdRedir.aspx?ID=RUP43XDAYXKA-2-4395</Url>
+      <Description>RUP43XDAYXKA-2-4395</Description>
+    </_dlc_DocIdUrl>
+  </documentManagement>
+</p:properties>
 </file>
 
-<file path=customXml/itemProps4.xml><?xml version="1.0" encoding="utf-8"?>
+<file path=customXml/itemProps1.xml><?xml version="1.0" encoding="utf-8"?>
 <ds:datastoreItem xmlns:ds="http://schemas.openxmlformats.org/officeDocument/2006/customXml" ds:itemID="{081FD53D-2ABA-4B69-925F-BDB723FA0A79}">
   <ds:schemaRefs>
     <ds:schemaRef ds:uri="http://schemas.microsoft.com/office/2006/metadata/contentType"/>
@@ -5598,4 +5989,30 @@
     <ds:schemaRef ds:uri="http://schemas.microsoft.com/internal/obd"/>
   </ds:schemaRefs>
 </ds:datastoreItem>
+</file>
+
+<file path=customXml/itemProps2.xml><?xml version="1.0" encoding="utf-8"?>
+<ds:datastoreItem xmlns:ds="http://schemas.openxmlformats.org/officeDocument/2006/customXml" ds:itemID="{CA62BF48-A576-4D85-A587-1744F931CE21}">
+  <ds:schemaRefs>
+    <ds:schemaRef ds:uri="http://schemas.microsoft.com/sharepoint/events"/>
+  </ds:schemaRefs>
+</ds:datastoreItem>
+</file>
+
+<file path=customXml/itemProps3.xml><?xml version="1.0" encoding="utf-8"?>
+<ds:datastoreItem xmlns:ds="http://schemas.openxmlformats.org/officeDocument/2006/customXml" ds:itemID="{507C3C16-BC59-4883-ABE4-0911E3FE1B90}">
+  <ds:schemaRefs>
+    <ds:schemaRef ds:uri="http://schemas.microsoft.com/sharepoint/v3/contenttype/forms"/>
+  </ds:schemaRefs>
+</ds:datastoreItem>
+</file>
+
+<file path=customXml/itemProps4.xml><?xml version="1.0" encoding="utf-8"?>
+<ds:datastoreItem xmlns:ds="http://schemas.openxmlformats.org/officeDocument/2006/customXml" ds:itemID="{188DB492-5879-4998-90FC-E865BEF428C1}">
+  <ds:schemaRefs>
+    <ds:schemaRef ds:uri="http://schemas.microsoft.com/office/2006/metadata/properties"/>
+    <ds:schemaRef ds:uri="http://schemas.microsoft.com/office/infopath/2007/PartnerControls"/>
+    <ds:schemaRef ds:uri="db534a5e-1222-4db9-a6da-47c142019016"/>
+  </ds:schemaRefs>
+</ds:datastoreItem>
 </file>
</xml_diff>

<commit_message>
Edited the powerpoint, looking good
</commit_message>
<xml_diff>
--- a/QA_Presentation/poster.pptx
+++ b/QA_Presentation/poster.pptx
@@ -147,12 +147,12 @@
   <pc:docChgLst>
     <pc:chgData name="J Call" userId="76f3ea24ed53b181" providerId="LiveId" clId="{92701684-DB11-47A5-ACA7-9A0906D5C753}"/>
     <pc:docChg chg="undo custSel modSld">
-      <pc:chgData name="J Call" userId="76f3ea24ed53b181" providerId="LiveId" clId="{92701684-DB11-47A5-ACA7-9A0906D5C753}" dt="2018-11-29T20:23:49.415" v="35" actId="14100"/>
+      <pc:chgData name="J Call" userId="76f3ea24ed53b181" providerId="LiveId" clId="{92701684-DB11-47A5-ACA7-9A0906D5C753}" dt="2018-11-30T23:22:46.056" v="348" actId="20577"/>
       <pc:docMkLst>
         <pc:docMk/>
       </pc:docMkLst>
       <pc:sldChg chg="addSp delSp modSp">
-        <pc:chgData name="J Call" userId="76f3ea24ed53b181" providerId="LiveId" clId="{92701684-DB11-47A5-ACA7-9A0906D5C753}" dt="2018-11-29T20:23:49.415" v="35" actId="14100"/>
+        <pc:chgData name="J Call" userId="76f3ea24ed53b181" providerId="LiveId" clId="{92701684-DB11-47A5-ACA7-9A0906D5C753}" dt="2018-11-30T23:22:46.056" v="348" actId="20577"/>
         <pc:sldMkLst>
           <pc:docMk/>
           <pc:sldMk cId="995827065" sldId="256"/>
@@ -163,6 +163,14 @@
             <pc:docMk/>
             <pc:sldMk cId="995827065" sldId="256"/>
             <ac:spMk id="2" creationId="{00000000-0000-0000-0000-000000000000}"/>
+          </ac:spMkLst>
+        </pc:spChg>
+        <pc:spChg chg="mod">
+          <ac:chgData name="J Call" userId="76f3ea24ed53b181" providerId="LiveId" clId="{92701684-DB11-47A5-ACA7-9A0906D5C753}" dt="2018-11-30T23:22:46.056" v="348" actId="20577"/>
+          <ac:spMkLst>
+            <pc:docMk/>
+            <pc:sldMk cId="995827065" sldId="256"/>
+            <ac:spMk id="9" creationId="{64B5003B-4ADD-4F2B-97EB-6C0EC77D4CEC}"/>
           </ac:spMkLst>
         </pc:spChg>
         <pc:spChg chg="add del mod">
@@ -179,6 +187,14 @@
             <pc:docMk/>
             <pc:sldMk cId="995827065" sldId="256"/>
             <ac:spMk id="13" creationId="{00000000-0000-0000-0000-000000000000}"/>
+          </ac:spMkLst>
+        </pc:spChg>
+        <pc:spChg chg="mod">
+          <ac:chgData name="J Call" userId="76f3ea24ed53b181" providerId="LiveId" clId="{92701684-DB11-47A5-ACA7-9A0906D5C753}" dt="2018-11-30T23:18:20.099" v="49" actId="20577"/>
+          <ac:spMkLst>
+            <pc:docMk/>
+            <pc:sldMk cId="995827065" sldId="256"/>
+            <ac:spMk id="16" creationId="{72802A9B-FFBD-4D43-BC8F-D7D39FDFC1D8}"/>
           </ac:spMkLst>
         </pc:spChg>
         <pc:spChg chg="mod">
@@ -324,7 +340,7 @@
           </a:lstStyle>
           <a:p>
             <a:fld id="{225BAF9D-FE07-6A49-A65C-640C238374BA}" type="datetime1">
-              <a:t>11/29/2018</a:t>
+              <a:t>11/30/2018</a:t>
             </a:fld>
             <a:endParaRPr lang="en-US"/>
           </a:p>
@@ -488,7 +504,7 @@
           </a:lstStyle>
           <a:p>
             <a:fld id="{C452C735-D8AC-6B47-A55A-6D5DBB87B596}" type="datetime1">
-              <a:t>11/29/2018</a:t>
+              <a:t>11/30/2018</a:t>
             </a:fld>
             <a:endParaRPr lang="en-US"/>
           </a:p>
@@ -1002,7 +1018,7 @@
           <a:lstStyle/>
           <a:p>
             <a:fld id="{12882538-7F94-AF4E-AC0E-2D4DA7163C25}" type="datetime1">
-              <a:t>11/29/2018</a:t>
+              <a:t>11/30/2018</a:t>
             </a:fld>
             <a:endParaRPr lang="en-US"/>
           </a:p>
@@ -1194,7 +1210,7 @@
           <a:lstStyle/>
           <a:p>
             <a:fld id="{B7E96A53-3239-8247-A129-F7433496CD79}" type="datetime1">
-              <a:t>11/29/2018</a:t>
+              <a:t>11/30/2018</a:t>
             </a:fld>
             <a:endParaRPr lang="en-US"/>
           </a:p>
@@ -1396,7 +1412,7 @@
           <a:lstStyle/>
           <a:p>
             <a:fld id="{33C20823-755A-3644-9771-D9245392EAAC}" type="datetime1">
-              <a:t>11/29/2018</a:t>
+              <a:t>11/30/2018</a:t>
             </a:fld>
             <a:endParaRPr lang="en-US"/>
           </a:p>
@@ -1588,7 +1604,7 @@
           <a:lstStyle/>
           <a:p>
             <a:fld id="{AFDF9FB8-A819-0644-B738-AB774D89CEFA}" type="datetime1">
-              <a:t>11/29/2018</a:t>
+              <a:t>11/30/2018</a:t>
             </a:fld>
             <a:endParaRPr lang="en-US"/>
           </a:p>
@@ -1857,7 +1873,7 @@
           <a:lstStyle/>
           <a:p>
             <a:fld id="{1BDCE683-4210-974B-9997-899DF9993CFA}" type="datetime1">
-              <a:t>11/29/2018</a:t>
+              <a:t>11/30/2018</a:t>
             </a:fld>
             <a:endParaRPr lang="en-US"/>
           </a:p>
@@ -2166,7 +2182,7 @@
           <a:lstStyle/>
           <a:p>
             <a:fld id="{BE850229-3D02-A441-9DE1-FD6F7F2646C5}" type="datetime1">
-              <a:t>11/29/2018</a:t>
+              <a:t>11/30/2018</a:t>
             </a:fld>
             <a:endParaRPr lang="en-US"/>
           </a:p>
@@ -2609,7 +2625,7 @@
           <a:lstStyle/>
           <a:p>
             <a:fld id="{AE4CB381-A10C-304B-B59A-BD82FBB5F212}" type="datetime1">
-              <a:t>11/29/2018</a:t>
+              <a:t>11/30/2018</a:t>
             </a:fld>
             <a:endParaRPr lang="en-US"/>
           </a:p>
@@ -2750,7 +2766,7 @@
           <a:lstStyle/>
           <a:p>
             <a:fld id="{15578EB0-43FE-8C49-A895-C3E882EECC5D}" type="datetime1">
-              <a:t>11/29/2018</a:t>
+              <a:t>11/30/2018</a:t>
             </a:fld>
             <a:endParaRPr lang="en-US"/>
           </a:p>
@@ -2869,7 +2885,7 @@
           <a:lstStyle/>
           <a:p>
             <a:fld id="{A2C466C8-91FA-1A4C-A29C-D4D236A51FE3}" type="datetime1">
-              <a:t>11/29/2018</a:t>
+              <a:t>11/30/2018</a:t>
             </a:fld>
             <a:endParaRPr lang="en-US"/>
           </a:p>
@@ -3168,7 +3184,7 @@
           <a:lstStyle/>
           <a:p>
             <a:fld id="{BB332400-AED5-2C46-BF66-A2FCCE99A32E}" type="datetime1">
-              <a:t>11/29/2018</a:t>
+              <a:t>11/30/2018</a:t>
             </a:fld>
             <a:endParaRPr lang="en-US"/>
           </a:p>
@@ -3444,7 +3460,7 @@
           <a:lstStyle/>
           <a:p>
             <a:fld id="{77669421-7F0D-6A4D-A945-B8164E1B877D}" type="datetime1">
-              <a:t>11/29/2018</a:t>
+              <a:t>11/30/2018</a:t>
             </a:fld>
             <a:endParaRPr lang="en-US"/>
           </a:p>
@@ -4457,7 +4473,7 @@
         <p:spPr>
           <a:xfrm>
             <a:off x="5006" y="3447563"/>
-            <a:ext cx="10972800" cy="14144321"/>
+            <a:ext cx="10972800" cy="14849643"/>
           </a:xfrm>
           <a:prstGeom prst="rect">
             <a:avLst/>
@@ -4480,7 +4496,7 @@
             </a:r>
             <a:r>
               <a:rPr lang="en-US" sz="3600" dirty="0"/>
-              <a:t> POS tagging, NER, word stemming, word overlap, Cosine Similarity</a:t>
+              <a:t> POS tagging, NER, word stemming, Cosine Similarity</a:t>
             </a:r>
           </a:p>
           <a:p>
@@ -4582,7 +4598,7 @@
             </a:r>
             <a:r>
               <a:rPr lang="en-US" sz="3600" dirty="0"/>
-              <a:t> the cornerstone of our system was originally question typing; we later added cosine similarity and what we call ‘verb typing’.  </a:t>
+              <a:t> The cornerstone of our system was originally question typing; we later added cosine similarity and what we call ‘verb typing’ – matching a verb in the question with verbs in the story.</a:t>
             </a:r>
           </a:p>
           <a:p>
@@ -4597,8 +4613,13 @@
             </a:r>
             <a:r>
               <a:rPr lang="en-US" sz="3600" dirty="0"/>
-              <a:t>To handle “what” questions, our system looks in the question for a verb and searches for sentences containing the rooted verb.</a:t>
-            </a:r>
+              <a:t>To handle “what” questions, our system performs cosine similarity on the portion of the question after </a:t>
+            </a:r>
+            <a:r>
+              <a:rPr lang="en-US" sz="3600"/>
+              <a:t>the relevant verb.</a:t>
+            </a:r>
+            <a:endParaRPr lang="en-US" sz="3600" dirty="0"/>
           </a:p>
           <a:p>
             <a:pPr>
@@ -4620,7 +4641,7 @@
             </a:r>
             <a:r>
               <a:rPr lang="en-US" sz="3600" dirty="0"/>
-              <a:t> We had an F-score of 0.32, with a recall of .38 and precision .28.  Our system did well with ‘who’ questions and questions asking for numbers.  </a:t>
+              <a:t> We achieved an F-score of 0.32, with .38 recall and .28 precision.  Our system did well with ‘who’ questions and questions asking for numbers.  </a:t>
             </a:r>
           </a:p>
         </p:txBody>
@@ -4707,7 +4728,7 @@
                   <a:prstClr val="black"/>
                 </a:solidFill>
               </a:rPr>
-              <a:t> limiting the response to 7 words before and after a verb didn’t work well.  It returned the correct answer in some cases, but hurt recall more than it helped precision.  </a:t>
+              <a:t> Limiting the response to 7 words before and after a verb didn’t work well.  It returned the correct answer in some cases, but hurt recall more than it helped precision.</a:t>
             </a:r>
           </a:p>
           <a:p>
@@ -4742,7 +4763,7 @@
                   <a:prstClr val="black"/>
                 </a:solidFill>
               </a:rPr>
-              <a:t> using question typing and NER in combination with cosine similarity was very successful, helping the system find likely answers depending on the question text.  </a:t>
+              <a:t> Using question typing and NER in combination with cosine similarity was very successful, helping the system find likely answers depending on the question text.</a:t>
             </a:r>
           </a:p>
           <a:p>
@@ -4777,7 +4798,7 @@
                   <a:prstClr val="black"/>
                 </a:solidFill>
               </a:rPr>
-              <a:t> it’s hard to build a system that can understand language and answer even the simplest of questions.  </a:t>
+              <a:t> It’s hard to build a system that can understand language and answer even the simplest of questions.  </a:t>
             </a:r>
             <a:endParaRPr lang="en-US" sz="3600" b="1" dirty="0">
               <a:solidFill>
@@ -5762,6 +5783,73 @@
 </file>
 
 <file path=customXml/item1.xml><?xml version="1.0" encoding="utf-8"?>
+<p:properties xmlns:p="http://schemas.microsoft.com/office/2006/metadata/properties" xmlns:xsi="http://www.w3.org/2001/XMLSchema-instance" xmlns:pc="http://schemas.microsoft.com/office/infopath/2007/PartnerControls">
+  <documentManagement>
+    <_dlc_DocId xmlns="db534a5e-1222-4db9-a6da-47c142019016">RUP43XDAYXKA-2-4395</_dlc_DocId>
+    <_dlc_DocIdUrl xmlns="db534a5e-1222-4db9-a6da-47c142019016">
+      <Url>https://staffnet.library.utah.edu/personal/u0031319/_layouts/DocIdRedir.aspx?ID=RUP43XDAYXKA-2-4395</Url>
+      <Description>RUP43XDAYXKA-2-4395</Description>
+    </_dlc_DocIdUrl>
+  </documentManagement>
+</p:properties>
+</file>
+
+<file path=customXml/item2.xml><?xml version="1.0" encoding="utf-8"?>
+<?mso-contentType ?>
+<FormTemplates xmlns="http://schemas.microsoft.com/sharepoint/v3/contenttype/forms">
+  <Display>DocumentLibraryForm</Display>
+  <Edit>DocumentLibraryForm</Edit>
+  <New>DocumentLibraryForm</New>
+</FormTemplates>
+</file>
+
+<file path=customXml/item3.xml><?xml version="1.0" encoding="utf-8"?>
+<?mso-contentType ?>
+<spe:Receivers xmlns:spe="http://schemas.microsoft.com/sharepoint/events">
+  <Receiver>
+    <Name>Document ID Generator</Name>
+    <Synchronization>Synchronous</Synchronization>
+    <Type>10001</Type>
+    <SequenceNumber>1000</SequenceNumber>
+    <Assembly>Microsoft.Office.DocumentManagement, Version=14.0.0.0, Culture=neutral, PublicKeyToken=71e9bce111e9429c</Assembly>
+    <Class>Microsoft.Office.DocumentManagement.Internal.DocIdHandler</Class>
+    <Data/>
+    <Filter/>
+  </Receiver>
+  <Receiver>
+    <Name>Document ID Generator</Name>
+    <Synchronization>Synchronous</Synchronization>
+    <Type>10002</Type>
+    <SequenceNumber>1001</SequenceNumber>
+    <Assembly>Microsoft.Office.DocumentManagement, Version=14.0.0.0, Culture=neutral, PublicKeyToken=71e9bce111e9429c</Assembly>
+    <Class>Microsoft.Office.DocumentManagement.Internal.DocIdHandler</Class>
+    <Data/>
+    <Filter/>
+  </Receiver>
+  <Receiver>
+    <Name>Document ID Generator</Name>
+    <Synchronization>Synchronous</Synchronization>
+    <Type>10004</Type>
+    <SequenceNumber>1002</SequenceNumber>
+    <Assembly>Microsoft.Office.DocumentManagement, Version=14.0.0.0, Culture=neutral, PublicKeyToken=71e9bce111e9429c</Assembly>
+    <Class>Microsoft.Office.DocumentManagement.Internal.DocIdHandler</Class>
+    <Data/>
+    <Filter/>
+  </Receiver>
+  <Receiver>
+    <Name>Document ID Generator</Name>
+    <Synchronization>Synchronous</Synchronization>
+    <Type>10006</Type>
+    <SequenceNumber>1003</SequenceNumber>
+    <Assembly>Microsoft.Office.DocumentManagement, Version=14.0.0.0, Culture=neutral, PublicKeyToken=71e9bce111e9429c</Assembly>
+    <Class>Microsoft.Office.DocumentManagement.Internal.DocIdHandler</Class>
+    <Data/>
+    <Filter/>
+  </Receiver>
+</spe:Receivers>
+</file>
+
+<file path=customXml/item4.xml><?xml version="1.0" encoding="utf-8"?>
 <ct:contentTypeSchema xmlns:ct="http://schemas.microsoft.com/office/2006/metadata/contentType" xmlns:ma="http://schemas.microsoft.com/office/2006/metadata/properties/metaAttributes" ct:_="" ma:_="" ma:contentTypeName="Document" ma:contentTypeID="0x010100198492E96F6ACC44BBBEB5EFA434EED1" ma:contentTypeVersion="1" ma:contentTypeDescription="Create a new document." ma:contentTypeScope="" ma:versionID="cf296b60bf990032323d1c6d41ae543b">
   <xsd:schema xmlns:xsd="http://www.w3.org/2001/XMLSchema" xmlns:xs="http://www.w3.org/2001/XMLSchema" xmlns:p="http://schemas.microsoft.com/office/2006/metadata/properties" xmlns:ns2="db534a5e-1222-4db9-a6da-47c142019016" targetNamespace="http://schemas.microsoft.com/office/2006/metadata/properties" ma:root="true" ma:fieldsID="491b76b6be48514c30ba3200299e7b7f" ns2:_="">
     <xsd:import namespace="db534a5e-1222-4db9-a6da-47c142019016"/>
@@ -5906,74 +5994,33 @@
 </ct:contentTypeSchema>
 </file>
 
-<file path=customXml/item2.xml><?xml version="1.0" encoding="utf-8"?>
-<?mso-contentType ?>
-<spe:Receivers xmlns:spe="http://schemas.microsoft.com/sharepoint/events">
-  <Receiver>
-    <Name>Document ID Generator</Name>
-    <Synchronization>Synchronous</Synchronization>
-    <Type>10001</Type>
-    <SequenceNumber>1000</SequenceNumber>
-    <Assembly>Microsoft.Office.DocumentManagement, Version=14.0.0.0, Culture=neutral, PublicKeyToken=71e9bce111e9429c</Assembly>
-    <Class>Microsoft.Office.DocumentManagement.Internal.DocIdHandler</Class>
-    <Data/>
-    <Filter/>
-  </Receiver>
-  <Receiver>
-    <Name>Document ID Generator</Name>
-    <Synchronization>Synchronous</Synchronization>
-    <Type>10002</Type>
-    <SequenceNumber>1001</SequenceNumber>
-    <Assembly>Microsoft.Office.DocumentManagement, Version=14.0.0.0, Culture=neutral, PublicKeyToken=71e9bce111e9429c</Assembly>
-    <Class>Microsoft.Office.DocumentManagement.Internal.DocIdHandler</Class>
-    <Data/>
-    <Filter/>
-  </Receiver>
-  <Receiver>
-    <Name>Document ID Generator</Name>
-    <Synchronization>Synchronous</Synchronization>
-    <Type>10004</Type>
-    <SequenceNumber>1002</SequenceNumber>
-    <Assembly>Microsoft.Office.DocumentManagement, Version=14.0.0.0, Culture=neutral, PublicKeyToken=71e9bce111e9429c</Assembly>
-    <Class>Microsoft.Office.DocumentManagement.Internal.DocIdHandler</Class>
-    <Data/>
-    <Filter/>
-  </Receiver>
-  <Receiver>
-    <Name>Document ID Generator</Name>
-    <Synchronization>Synchronous</Synchronization>
-    <Type>10006</Type>
-    <SequenceNumber>1003</SequenceNumber>
-    <Assembly>Microsoft.Office.DocumentManagement, Version=14.0.0.0, Culture=neutral, PublicKeyToken=71e9bce111e9429c</Assembly>
-    <Class>Microsoft.Office.DocumentManagement.Internal.DocIdHandler</Class>
-    <Data/>
-    <Filter/>
-  </Receiver>
-</spe:Receivers>
+<file path=customXml/itemProps1.xml><?xml version="1.0" encoding="utf-8"?>
+<ds:datastoreItem xmlns:ds="http://schemas.openxmlformats.org/officeDocument/2006/customXml" ds:itemID="{188DB492-5879-4998-90FC-E865BEF428C1}">
+  <ds:schemaRefs>
+    <ds:schemaRef ds:uri="http://schemas.microsoft.com/office/2006/metadata/properties"/>
+    <ds:schemaRef ds:uri="http://schemas.microsoft.com/office/infopath/2007/PartnerControls"/>
+    <ds:schemaRef ds:uri="db534a5e-1222-4db9-a6da-47c142019016"/>
+  </ds:schemaRefs>
+</ds:datastoreItem>
 </file>
 
-<file path=customXml/item3.xml><?xml version="1.0" encoding="utf-8"?>
-<?mso-contentType ?>
-<FormTemplates xmlns="http://schemas.microsoft.com/sharepoint/v3/contenttype/forms">
-  <Display>DocumentLibraryForm</Display>
-  <Edit>DocumentLibraryForm</Edit>
-  <New>DocumentLibraryForm</New>
-</FormTemplates>
+<file path=customXml/itemProps2.xml><?xml version="1.0" encoding="utf-8"?>
+<ds:datastoreItem xmlns:ds="http://schemas.openxmlformats.org/officeDocument/2006/customXml" ds:itemID="{507C3C16-BC59-4883-ABE4-0911E3FE1B90}">
+  <ds:schemaRefs>
+    <ds:schemaRef ds:uri="http://schemas.microsoft.com/sharepoint/v3/contenttype/forms"/>
+  </ds:schemaRefs>
+</ds:datastoreItem>
 </file>
 
-<file path=customXml/item4.xml><?xml version="1.0" encoding="utf-8"?>
-<p:properties xmlns:p="http://schemas.microsoft.com/office/2006/metadata/properties" xmlns:xsi="http://www.w3.org/2001/XMLSchema-instance" xmlns:pc="http://schemas.microsoft.com/office/infopath/2007/PartnerControls">
-  <documentManagement>
-    <_dlc_DocId xmlns="db534a5e-1222-4db9-a6da-47c142019016">RUP43XDAYXKA-2-4395</_dlc_DocId>
-    <_dlc_DocIdUrl xmlns="db534a5e-1222-4db9-a6da-47c142019016">
-      <Url>https://staffnet.library.utah.edu/personal/u0031319/_layouts/DocIdRedir.aspx?ID=RUP43XDAYXKA-2-4395</Url>
-      <Description>RUP43XDAYXKA-2-4395</Description>
-    </_dlc_DocIdUrl>
-  </documentManagement>
-</p:properties>
+<file path=customXml/itemProps3.xml><?xml version="1.0" encoding="utf-8"?>
+<ds:datastoreItem xmlns:ds="http://schemas.openxmlformats.org/officeDocument/2006/customXml" ds:itemID="{CA62BF48-A576-4D85-A587-1744F931CE21}">
+  <ds:schemaRefs>
+    <ds:schemaRef ds:uri="http://schemas.microsoft.com/sharepoint/events"/>
+  </ds:schemaRefs>
+</ds:datastoreItem>
 </file>
 
-<file path=customXml/itemProps1.xml><?xml version="1.0" encoding="utf-8"?>
+<file path=customXml/itemProps4.xml><?xml version="1.0" encoding="utf-8"?>
 <ds:datastoreItem xmlns:ds="http://schemas.openxmlformats.org/officeDocument/2006/customXml" ds:itemID="{081FD53D-2ABA-4B69-925F-BDB723FA0A79}">
   <ds:schemaRefs>
     <ds:schemaRef ds:uri="http://schemas.microsoft.com/office/2006/metadata/contentType"/>
@@ -5989,30 +6036,4 @@
     <ds:schemaRef ds:uri="http://schemas.microsoft.com/internal/obd"/>
   </ds:schemaRefs>
 </ds:datastoreItem>
-</file>
-
-<file path=customXml/itemProps2.xml><?xml version="1.0" encoding="utf-8"?>
-<ds:datastoreItem xmlns:ds="http://schemas.openxmlformats.org/officeDocument/2006/customXml" ds:itemID="{CA62BF48-A576-4D85-A587-1744F931CE21}">
-  <ds:schemaRefs>
-    <ds:schemaRef ds:uri="http://schemas.microsoft.com/sharepoint/events"/>
-  </ds:schemaRefs>
-</ds:datastoreItem>
-</file>
-
-<file path=customXml/itemProps3.xml><?xml version="1.0" encoding="utf-8"?>
-<ds:datastoreItem xmlns:ds="http://schemas.openxmlformats.org/officeDocument/2006/customXml" ds:itemID="{507C3C16-BC59-4883-ABE4-0911E3FE1B90}">
-  <ds:schemaRefs>
-    <ds:schemaRef ds:uri="http://schemas.microsoft.com/sharepoint/v3/contenttype/forms"/>
-  </ds:schemaRefs>
-</ds:datastoreItem>
-</file>
-
-<file path=customXml/itemProps4.xml><?xml version="1.0" encoding="utf-8"?>
-<ds:datastoreItem xmlns:ds="http://schemas.openxmlformats.org/officeDocument/2006/customXml" ds:itemID="{188DB492-5879-4998-90FC-E865BEF428C1}">
-  <ds:schemaRefs>
-    <ds:schemaRef ds:uri="http://schemas.microsoft.com/office/2006/metadata/properties"/>
-    <ds:schemaRef ds:uri="http://schemas.microsoft.com/office/infopath/2007/PartnerControls"/>
-    <ds:schemaRef ds:uri="db534a5e-1222-4db9-a6da-47c142019016"/>
-  </ds:schemaRefs>
-</ds:datastoreItem>
 </file>
</xml_diff>